<commit_message>
updated results section and residual graphs
</commit_message>
<xml_diff>
--- a/presentations/result Presentation.pptx
+++ b/presentations/result Presentation.pptx
@@ -11,8 +11,9 @@
     <p:sldId id="259" r:id="rId5"/>
     <p:sldId id="260" r:id="rId6"/>
     <p:sldId id="261" r:id="rId7"/>
-    <p:sldId id="262" r:id="rId8"/>
-    <p:sldId id="263" r:id="rId9"/>
+    <p:sldId id="264" r:id="rId8"/>
+    <p:sldId id="262" r:id="rId9"/>
+    <p:sldId id="263" r:id="rId10"/>
   </p:sldIdLst>
   <p:sldSz cx="12192000" cy="6858000"/>
   <p:notesSz cx="6858000" cy="9144000"/>
@@ -111,6 +112,11 @@
       </a:defRPr>
     </a:lvl9pPr>
   </p:defaultTextStyle>
+  <p:extLst>
+    <p:ext uri="{EFAFB233-063F-42B5-8137-9DF3F51BA10A}">
+      <p15:sldGuideLst xmlns:p15="http://schemas.microsoft.com/office/powerpoint/2012/main"/>
+    </p:ext>
+  </p:extLst>
 </p:presentation>
 </file>
 
@@ -4345,6 +4351,106 @@
           <p:cNvPr id="2" name="标题 1">
             <a:extLst>
               <a:ext uri="{FF2B5EF4-FFF2-40B4-BE49-F238E27FC236}">
+                <a16:creationId xmlns:a16="http://schemas.microsoft.com/office/drawing/2014/main" id="{5347737B-542E-2AFF-BE94-D21C5D8EF2E2}"/>
+              </a:ext>
+            </a:extLst>
+          </p:cNvPr>
+          <p:cNvSpPr>
+            <a:spLocks noGrp="1"/>
+          </p:cNvSpPr>
+          <p:nvPr>
+            <p:ph type="title"/>
+          </p:nvPr>
+        </p:nvSpPr>
+        <p:spPr/>
+        <p:txBody>
+          <a:bodyPr/>
+          <a:lstStyle/>
+          <a:p>
+            <a:r>
+              <a:rPr lang="en-US" altLang="zh-CN" dirty="0"/>
+              <a:t>Reduced controls (robustness check?)</a:t>
+            </a:r>
+            <a:endParaRPr lang="zh-CN" altLang="en-US" dirty="0"/>
+          </a:p>
+        </p:txBody>
+      </p:sp>
+      <p:sp>
+        <p:nvSpPr>
+          <p:cNvPr id="3" name="内容占位符 2">
+            <a:extLst>
+              <a:ext uri="{FF2B5EF4-FFF2-40B4-BE49-F238E27FC236}">
+                <a16:creationId xmlns:a16="http://schemas.microsoft.com/office/drawing/2014/main" id="{94898202-F4A1-02AE-521C-85FF952D7C4E}"/>
+              </a:ext>
+            </a:extLst>
+          </p:cNvPr>
+          <p:cNvSpPr>
+            <a:spLocks noGrp="1"/>
+          </p:cNvSpPr>
+          <p:nvPr>
+            <p:ph idx="1"/>
+          </p:nvPr>
+        </p:nvSpPr>
+        <p:spPr/>
+        <p:txBody>
+          <a:bodyPr/>
+          <a:lstStyle/>
+          <a:p>
+            <a:r>
+              <a:rPr lang="en-US" altLang="zh-CN" dirty="0"/>
+              <a:t>Based on the regression results from Table 2 (which includes only economic controls), a reduced model was estimated in Table 4, where only the control variables that are statistically significant were retained. In Table 5, time fixed effects are further applied.</a:t>
+            </a:r>
+          </a:p>
+          <a:p>
+            <a:r>
+              <a:rPr lang="en-US" altLang="zh-CN" dirty="0"/>
+              <a:t>The coefficients before and after the reduction remain in the same direction and have similar magnitudes, with only minor changes in significance levels.</a:t>
+            </a:r>
+          </a:p>
+          <a:p>
+            <a:r>
+              <a:rPr lang="en-US" altLang="zh-CN" dirty="0"/>
+              <a:t>The non-linear impact of higher education expansion becomes more evident after including time fixed effects, and this pattern is also observable in the reduced model.</a:t>
+            </a:r>
+            <a:endParaRPr lang="zh-CN" altLang="en-US" dirty="0"/>
+          </a:p>
+        </p:txBody>
+      </p:sp>
+    </p:spTree>
+    <p:extLst>
+      <p:ext uri="{BB962C8B-B14F-4D97-AF65-F5344CB8AC3E}">
+        <p14:creationId xmlns:p14="http://schemas.microsoft.com/office/powerpoint/2010/main" val="1220620686"/>
+      </p:ext>
+    </p:extLst>
+  </p:cSld>
+  <p:clrMapOvr>
+    <a:masterClrMapping/>
+  </p:clrMapOvr>
+</p:sld>
+</file>
+
+<file path=ppt/slides/slide8.xml><?xml version="1.0" encoding="utf-8"?>
+<p:sld xmlns:a="http://schemas.openxmlformats.org/drawingml/2006/main" xmlns:r="http://schemas.openxmlformats.org/officeDocument/2006/relationships" xmlns:p="http://schemas.openxmlformats.org/presentationml/2006/main">
+  <p:cSld>
+    <p:spTree>
+      <p:nvGrpSpPr>
+        <p:cNvPr id="1" name=""/>
+        <p:cNvGrpSpPr/>
+        <p:nvPr/>
+      </p:nvGrpSpPr>
+      <p:grpSpPr>
+        <a:xfrm>
+          <a:off x="0" y="0"/>
+          <a:ext cx="0" cy="0"/>
+          <a:chOff x="0" y="0"/>
+          <a:chExt cx="0" cy="0"/>
+        </a:xfrm>
+      </p:grpSpPr>
+      <p:sp>
+        <p:nvSpPr>
+          <p:cNvPr id="2" name="标题 1">
+            <a:extLst>
+              <a:ext uri="{FF2B5EF4-FFF2-40B4-BE49-F238E27FC236}">
                 <a16:creationId xmlns:a16="http://schemas.microsoft.com/office/drawing/2014/main" id="{939D1368-28B7-F0B9-B7A1-F055A9318878}"/>
               </a:ext>
             </a:extLst>
@@ -4361,10 +4467,6 @@
           <a:bodyPr/>
           <a:lstStyle/>
           <a:p>
-            <a:r>
-              <a:rPr lang="en-US" altLang="zh-CN" dirty="0"/>
-              <a:t>Reduced controls (robustness check)</a:t>
-            </a:r>
             <a:endParaRPr lang="zh-CN" altLang="en-US" dirty="0"/>
           </a:p>
         </p:txBody>
@@ -4396,10 +4498,10 @@
       </p:sp>
       <p:pic>
         <p:nvPicPr>
-          <p:cNvPr id="5" name="图片 4">
+          <p:cNvPr id="6" name="图片 5">
             <a:extLst>
               <a:ext uri="{FF2B5EF4-FFF2-40B4-BE49-F238E27FC236}">
-                <a16:creationId xmlns:a16="http://schemas.microsoft.com/office/drawing/2014/main" id="{23DB44FA-E27D-F64F-6643-C57EB8A095D5}"/>
+                <a16:creationId xmlns:a16="http://schemas.microsoft.com/office/drawing/2014/main" id="{4454C267-4869-662E-F4E1-17A11FE4E963}"/>
               </a:ext>
             </a:extLst>
           </p:cNvPr>
@@ -4416,8 +4518,8 @@
         </p:blipFill>
         <p:spPr>
           <a:xfrm>
-            <a:off x="381000" y="1391655"/>
-            <a:ext cx="5133975" cy="4753300"/>
+            <a:off x="0" y="1391655"/>
+            <a:ext cx="5267325" cy="4798391"/>
           </a:xfrm>
           <a:prstGeom prst="rect">
             <a:avLst/>
@@ -4426,10 +4528,10 @@
       </p:pic>
       <p:pic>
         <p:nvPicPr>
-          <p:cNvPr id="7" name="图片 6">
+          <p:cNvPr id="9" name="图片 8">
             <a:extLst>
               <a:ext uri="{FF2B5EF4-FFF2-40B4-BE49-F238E27FC236}">
-                <a16:creationId xmlns:a16="http://schemas.microsoft.com/office/drawing/2014/main" id="{6CB1AA37-480D-EF95-810F-BEE5EE9F3709}"/>
+                <a16:creationId xmlns:a16="http://schemas.microsoft.com/office/drawing/2014/main" id="{BE696398-45CA-8C1E-894C-E37B354B04E1}"/>
               </a:ext>
             </a:extLst>
           </p:cNvPr>
@@ -4446,8 +4548,8 @@
         </p:blipFill>
         <p:spPr>
           <a:xfrm>
-            <a:off x="6677027" y="1391655"/>
-            <a:ext cx="5267325" cy="4777836"/>
+            <a:off x="6791021" y="1391654"/>
+            <a:ext cx="5400979" cy="4798391"/>
           </a:xfrm>
           <a:prstGeom prst="rect">
             <a:avLst/>
@@ -4467,7 +4569,7 @@
 </p:sld>
 </file>
 
-<file path=ppt/slides/slide8.xml><?xml version="1.0" encoding="utf-8"?>
+<file path=ppt/slides/slide9.xml><?xml version="1.0" encoding="utf-8"?>
 <p:sld xmlns:a="http://schemas.openxmlformats.org/drawingml/2006/main" xmlns:r="http://schemas.openxmlformats.org/officeDocument/2006/relationships" xmlns:p="http://schemas.openxmlformats.org/presentationml/2006/main">
   <p:cSld>
     <p:spTree>

</xml_diff>